<commit_message>
new script for tool installation
</commit_message>
<xml_diff>
--- a/Help/Tool_installation.pptx
+++ b/Help/Tool_installation.pptx
@@ -5,12 +5,16 @@
     <p:sldMasterId id="2147483648" r:id="rId1"/>
   </p:sldMasterIdLst>
   <p:notesMasterIdLst>
-    <p:notesMasterId r:id="rId5"/>
+    <p:notesMasterId r:id="rId9"/>
   </p:notesMasterIdLst>
   <p:sldIdLst>
     <p:sldId id="258" r:id="rId2"/>
     <p:sldId id="259" r:id="rId3"/>
     <p:sldId id="260" r:id="rId4"/>
+    <p:sldId id="261" r:id="rId5"/>
+    <p:sldId id="262" r:id="rId6"/>
+    <p:sldId id="263" r:id="rId7"/>
+    <p:sldId id="264" r:id="rId8"/>
   </p:sldIdLst>
   <p:sldSz cx="12192000" cy="6858000"/>
   <p:notesSz cx="6858000" cy="9144000"/>
@@ -117,6 +121,198 @@
 </p:presentation>
 </file>
 
+<file path=ppt/revisionInfo.xml><?xml version="1.0" encoding="utf-8"?>
+<p1510:revInfo xmlns:a="http://schemas.openxmlformats.org/drawingml/2006/main" xmlns:r="http://schemas.openxmlformats.org/officeDocument/2006/relationships" xmlns:p1510="http://schemas.microsoft.com/office/powerpoint/2015/10/main">
+  <p1510:revLst>
+    <p1510:client id="{FD67BDBF-8597-45AA-A99F-D543B7D63C9F}" v="9" dt="2021-12-06T01:48:49.134"/>
+  </p1510:revLst>
+</p1510:revInfo>
+</file>
+
+<file path=ppt/changesInfos/changesInfo1.xml><?xml version="1.0" encoding="utf-8"?>
+<pc:chgInfo xmlns:a="http://schemas.openxmlformats.org/drawingml/2006/main" xmlns:r="http://schemas.openxmlformats.org/officeDocument/2006/relationships" xmlns:ac="http://schemas.microsoft.com/office/drawing/2013/main/command" xmlns:pc="http://schemas.microsoft.com/office/powerpoint/2013/main/command">
+  <pc:docChgLst>
+    <pc:chgData name="Weifeng Xu" userId="e7aed605-a3dd-4d5a-a692-a87037af107b" providerId="ADAL" clId="{FD67BDBF-8597-45AA-A99F-D543B7D63C9F}"/>
+    <pc:docChg chg="undo custSel addSld modSld">
+      <pc:chgData name="Weifeng Xu" userId="e7aed605-a3dd-4d5a-a692-a87037af107b" providerId="ADAL" clId="{FD67BDBF-8597-45AA-A99F-D543B7D63C9F}" dt="2021-12-06T01:49:30.870" v="408" actId="20577"/>
+      <pc:docMkLst>
+        <pc:docMk/>
+      </pc:docMkLst>
+      <pc:sldChg chg="modSp mod">
+        <pc:chgData name="Weifeng Xu" userId="e7aed605-a3dd-4d5a-a692-a87037af107b" providerId="ADAL" clId="{FD67BDBF-8597-45AA-A99F-D543B7D63C9F}" dt="2021-12-06T00:31:10.139" v="322" actId="20577"/>
+        <pc:sldMkLst>
+          <pc:docMk/>
+          <pc:sldMk cId="1392771324" sldId="258"/>
+        </pc:sldMkLst>
+        <pc:spChg chg="mod">
+          <ac:chgData name="Weifeng Xu" userId="e7aed605-a3dd-4d5a-a692-a87037af107b" providerId="ADAL" clId="{FD67BDBF-8597-45AA-A99F-D543B7D63C9F}" dt="2021-12-06T00:31:10.139" v="322" actId="20577"/>
+          <ac:spMkLst>
+            <pc:docMk/>
+            <pc:sldMk cId="1392771324" sldId="258"/>
+            <ac:spMk id="4" creationId="{00000000-0000-0000-0000-000000000000}"/>
+          </ac:spMkLst>
+        </pc:spChg>
+      </pc:sldChg>
+      <pc:sldChg chg="addSp modSp mod">
+        <pc:chgData name="Weifeng Xu" userId="e7aed605-a3dd-4d5a-a692-a87037af107b" providerId="ADAL" clId="{FD67BDBF-8597-45AA-A99F-D543B7D63C9F}" dt="2021-12-05T23:34:48.232" v="160" actId="1076"/>
+        <pc:sldMkLst>
+          <pc:docMk/>
+          <pc:sldMk cId="2286009671" sldId="260"/>
+        </pc:sldMkLst>
+        <pc:spChg chg="add mod">
+          <ac:chgData name="Weifeng Xu" userId="e7aed605-a3dd-4d5a-a692-a87037af107b" providerId="ADAL" clId="{FD67BDBF-8597-45AA-A99F-D543B7D63C9F}" dt="2021-12-05T23:34:48.232" v="160" actId="1076"/>
+          <ac:spMkLst>
+            <pc:docMk/>
+            <pc:sldMk cId="2286009671" sldId="260"/>
+            <ac:spMk id="4" creationId="{303FFD26-04AD-46A7-A66E-5DE553BB6335}"/>
+          </ac:spMkLst>
+        </pc:spChg>
+      </pc:sldChg>
+      <pc:sldChg chg="addSp delSp modSp new mod">
+        <pc:chgData name="Weifeng Xu" userId="e7aed605-a3dd-4d5a-a692-a87037af107b" providerId="ADAL" clId="{FD67BDBF-8597-45AA-A99F-D543B7D63C9F}" dt="2021-12-05T23:33:28.741" v="144" actId="20577"/>
+        <pc:sldMkLst>
+          <pc:docMk/>
+          <pc:sldMk cId="630671023" sldId="261"/>
+        </pc:sldMkLst>
+        <pc:spChg chg="add del mod">
+          <ac:chgData name="Weifeng Xu" userId="e7aed605-a3dd-4d5a-a692-a87037af107b" providerId="ADAL" clId="{FD67BDBF-8597-45AA-A99F-D543B7D63C9F}" dt="2021-12-05T23:30:40.669" v="12" actId="767"/>
+          <ac:spMkLst>
+            <pc:docMk/>
+            <pc:sldMk cId="630671023" sldId="261"/>
+            <ac:spMk id="4" creationId="{5A81979E-EA7D-4A7E-BFD8-CEFAFA5452A4}"/>
+          </ac:spMkLst>
+        </pc:spChg>
+        <pc:spChg chg="add mod">
+          <ac:chgData name="Weifeng Xu" userId="e7aed605-a3dd-4d5a-a692-a87037af107b" providerId="ADAL" clId="{FD67BDBF-8597-45AA-A99F-D543B7D63C9F}" dt="2021-12-05T23:33:28.741" v="144" actId="20577"/>
+          <ac:spMkLst>
+            <pc:docMk/>
+            <pc:sldMk cId="630671023" sldId="261"/>
+            <ac:spMk id="5" creationId="{B577749B-5C9B-4D97-A81E-B8337F04ACD0}"/>
+          </ac:spMkLst>
+        </pc:spChg>
+        <pc:spChg chg="add del mod">
+          <ac:chgData name="Weifeng Xu" userId="e7aed605-a3dd-4d5a-a692-a87037af107b" providerId="ADAL" clId="{FD67BDBF-8597-45AA-A99F-D543B7D63C9F}" dt="2021-12-05T23:33:16.170" v="105"/>
+          <ac:spMkLst>
+            <pc:docMk/>
+            <pc:sldMk cId="630671023" sldId="261"/>
+            <ac:spMk id="6" creationId="{4DD63583-2279-491D-BF79-9F6CADFC16E2}"/>
+          </ac:spMkLst>
+        </pc:spChg>
+        <pc:picChg chg="add mod">
+          <ac:chgData name="Weifeng Xu" userId="e7aed605-a3dd-4d5a-a692-a87037af107b" providerId="ADAL" clId="{FD67BDBF-8597-45AA-A99F-D543B7D63C9F}" dt="2021-12-05T23:32:52.886" v="102" actId="1076"/>
+          <ac:picMkLst>
+            <pc:docMk/>
+            <pc:sldMk cId="630671023" sldId="261"/>
+            <ac:picMk id="3" creationId="{9480B303-B423-455C-BE64-A5606F14ADFB}"/>
+          </ac:picMkLst>
+        </pc:picChg>
+      </pc:sldChg>
+      <pc:sldChg chg="addSp delSp modSp new mod modNotesTx">
+        <pc:chgData name="Weifeng Xu" userId="e7aed605-a3dd-4d5a-a692-a87037af107b" providerId="ADAL" clId="{FD67BDBF-8597-45AA-A99F-D543B7D63C9F}" dt="2021-12-06T01:44:45.420" v="325" actId="1076"/>
+        <pc:sldMkLst>
+          <pc:docMk/>
+          <pc:sldMk cId="3083790316" sldId="262"/>
+        </pc:sldMkLst>
+        <pc:spChg chg="add mod">
+          <ac:chgData name="Weifeng Xu" userId="e7aed605-a3dd-4d5a-a692-a87037af107b" providerId="ADAL" clId="{FD67BDBF-8597-45AA-A99F-D543B7D63C9F}" dt="2021-12-06T00:03:37.244" v="254" actId="20577"/>
+          <ac:spMkLst>
+            <pc:docMk/>
+            <pc:sldMk cId="3083790316" sldId="262"/>
+            <ac:spMk id="4" creationId="{4DAEB8E1-78F8-488C-AD70-CFD781193B72}"/>
+          </ac:spMkLst>
+        </pc:spChg>
+        <pc:picChg chg="add del mod">
+          <ac:chgData name="Weifeng Xu" userId="e7aed605-a3dd-4d5a-a692-a87037af107b" providerId="ADAL" clId="{FD67BDBF-8597-45AA-A99F-D543B7D63C9F}" dt="2021-12-06T01:44:13.628" v="323" actId="478"/>
+          <ac:picMkLst>
+            <pc:docMk/>
+            <pc:sldMk cId="3083790316" sldId="262"/>
+            <ac:picMk id="3" creationId="{DC1125DC-E2EF-46E0-B57E-13F59DC92256}"/>
+          </ac:picMkLst>
+        </pc:picChg>
+        <pc:picChg chg="add mod">
+          <ac:chgData name="Weifeng Xu" userId="e7aed605-a3dd-4d5a-a692-a87037af107b" providerId="ADAL" clId="{FD67BDBF-8597-45AA-A99F-D543B7D63C9F}" dt="2021-12-06T01:44:45.420" v="325" actId="1076"/>
+          <ac:picMkLst>
+            <pc:docMk/>
+            <pc:sldMk cId="3083790316" sldId="262"/>
+            <ac:picMk id="6" creationId="{BE7DF6FD-F81E-4FB0-88CA-C5C525AC36E6}"/>
+          </ac:picMkLst>
+        </pc:picChg>
+      </pc:sldChg>
+      <pc:sldChg chg="addSp delSp modSp new mod">
+        <pc:chgData name="Weifeng Xu" userId="e7aed605-a3dd-4d5a-a692-a87037af107b" providerId="ADAL" clId="{FD67BDBF-8597-45AA-A99F-D543B7D63C9F}" dt="2021-12-06T01:47:34.015" v="328" actId="1076"/>
+        <pc:sldMkLst>
+          <pc:docMk/>
+          <pc:sldMk cId="182520641" sldId="263"/>
+        </pc:sldMkLst>
+        <pc:spChg chg="add mod">
+          <ac:chgData name="Weifeng Xu" userId="e7aed605-a3dd-4d5a-a692-a87037af107b" providerId="ADAL" clId="{FD67BDBF-8597-45AA-A99F-D543B7D63C9F}" dt="2021-12-06T00:07:47.040" v="316" actId="20577"/>
+          <ac:spMkLst>
+            <pc:docMk/>
+            <pc:sldMk cId="182520641" sldId="263"/>
+            <ac:spMk id="6" creationId="{D6E2BE78-65E9-4AE9-914E-6030127E2FF3}"/>
+          </ac:spMkLst>
+        </pc:spChg>
+        <pc:spChg chg="add mod">
+          <ac:chgData name="Weifeng Xu" userId="e7aed605-a3dd-4d5a-a692-a87037af107b" providerId="ADAL" clId="{FD67BDBF-8597-45AA-A99F-D543B7D63C9F}" dt="2021-12-06T00:07:53.248" v="321" actId="20577"/>
+          <ac:spMkLst>
+            <pc:docMk/>
+            <pc:sldMk cId="182520641" sldId="263"/>
+            <ac:spMk id="7" creationId="{A2FB07EC-1DDF-4D9B-A06D-821DC660C03C}"/>
+          </ac:spMkLst>
+        </pc:spChg>
+        <pc:picChg chg="add mod">
+          <ac:chgData name="Weifeng Xu" userId="e7aed605-a3dd-4d5a-a692-a87037af107b" providerId="ADAL" clId="{FD67BDBF-8597-45AA-A99F-D543B7D63C9F}" dt="2021-12-06T00:06:50.275" v="263" actId="1076"/>
+          <ac:picMkLst>
+            <pc:docMk/>
+            <pc:sldMk cId="182520641" sldId="263"/>
+            <ac:picMk id="3" creationId="{87C902FC-FA35-42DC-9ACE-A8EC34A42E98}"/>
+          </ac:picMkLst>
+        </pc:picChg>
+        <pc:picChg chg="add del mod">
+          <ac:chgData name="Weifeng Xu" userId="e7aed605-a3dd-4d5a-a692-a87037af107b" providerId="ADAL" clId="{FD67BDBF-8597-45AA-A99F-D543B7D63C9F}" dt="2021-12-06T01:46:55.912" v="326" actId="478"/>
+          <ac:picMkLst>
+            <pc:docMk/>
+            <pc:sldMk cId="182520641" sldId="263"/>
+            <ac:picMk id="5" creationId="{888AE4DF-D4D8-4BD1-809C-E27BADD642F5}"/>
+          </ac:picMkLst>
+        </pc:picChg>
+        <pc:picChg chg="add mod">
+          <ac:chgData name="Weifeng Xu" userId="e7aed605-a3dd-4d5a-a692-a87037af107b" providerId="ADAL" clId="{FD67BDBF-8597-45AA-A99F-D543B7D63C9F}" dt="2021-12-06T01:47:34.015" v="328" actId="1076"/>
+          <ac:picMkLst>
+            <pc:docMk/>
+            <pc:sldMk cId="182520641" sldId="263"/>
+            <ac:picMk id="9" creationId="{6AC45E9D-FD45-4E9D-8872-E9E017692AB7}"/>
+          </ac:picMkLst>
+        </pc:picChg>
+      </pc:sldChg>
+      <pc:sldChg chg="addSp modSp new mod">
+        <pc:chgData name="Weifeng Xu" userId="e7aed605-a3dd-4d5a-a692-a87037af107b" providerId="ADAL" clId="{FD67BDBF-8597-45AA-A99F-D543B7D63C9F}" dt="2021-12-06T01:49:30.870" v="408" actId="20577"/>
+        <pc:sldMkLst>
+          <pc:docMk/>
+          <pc:sldMk cId="3541242312" sldId="264"/>
+        </pc:sldMkLst>
+        <pc:spChg chg="add mod">
+          <ac:chgData name="Weifeng Xu" userId="e7aed605-a3dd-4d5a-a692-a87037af107b" providerId="ADAL" clId="{FD67BDBF-8597-45AA-A99F-D543B7D63C9F}" dt="2021-12-06T01:49:30.870" v="408" actId="20577"/>
+          <ac:spMkLst>
+            <pc:docMk/>
+            <pc:sldMk cId="3541242312" sldId="264"/>
+            <ac:spMk id="4" creationId="{C0BA3F63-FC76-488B-8B77-DF400E1F0C44}"/>
+          </ac:spMkLst>
+        </pc:spChg>
+        <pc:picChg chg="add mod">
+          <ac:chgData name="Weifeng Xu" userId="e7aed605-a3dd-4d5a-a692-a87037af107b" providerId="ADAL" clId="{FD67BDBF-8597-45AA-A99F-D543B7D63C9F}" dt="2021-12-06T01:48:34.081" v="336" actId="1076"/>
+          <ac:picMkLst>
+            <pc:docMk/>
+            <pc:sldMk cId="3541242312" sldId="264"/>
+            <ac:picMk id="3" creationId="{CF56EC7F-AE97-4545-B600-20CC1218EF4E}"/>
+          </ac:picMkLst>
+        </pc:picChg>
+      </pc:sldChg>
+    </pc:docChg>
+  </pc:docChgLst>
+</pc:chgInfo>
+</file>
+
 <file path=ppt/notesMasters/notesMaster1.xml><?xml version="1.0" encoding="utf-8"?>
 <p:notesMaster xmlns:a="http://schemas.openxmlformats.org/drawingml/2006/main" xmlns:r="http://schemas.openxmlformats.org/officeDocument/2006/relationships" xmlns:p="http://schemas.openxmlformats.org/presentationml/2006/main">
   <p:cSld>
@@ -199,7 +395,7 @@
           <a:p>
             <a:fld id="{EE41F6E3-57F9-402E-BDBA-5B2DE11C8530}" type="datetimeFigureOut">
               <a:rPr lang="en-US" smtClean="0"/>
-              <a:t>2/20/2021</a:t>
+              <a:t>12/5/2021</a:t>
             </a:fld>
             <a:endParaRPr lang="en-US"/>
           </a:p>
@@ -739,6 +935,561 @@
 </p:notes>
 </file>
 
+<file path=ppt/notesSlides/notesSlide4.xml><?xml version="1.0" encoding="utf-8"?>
+<p:notes xmlns:a="http://schemas.openxmlformats.org/drawingml/2006/main" xmlns:r="http://schemas.openxmlformats.org/officeDocument/2006/relationships" xmlns:p="http://schemas.openxmlformats.org/presentationml/2006/main">
+  <p:cSld>
+    <p:spTree>
+      <p:nvGrpSpPr>
+        <p:cNvPr id="1" name=""/>
+        <p:cNvGrpSpPr/>
+        <p:nvPr/>
+      </p:nvGrpSpPr>
+      <p:grpSpPr>
+        <a:xfrm>
+          <a:off x="0" y="0"/>
+          <a:ext cx="0" cy="0"/>
+          <a:chOff x="0" y="0"/>
+          <a:chExt cx="0" cy="0"/>
+        </a:xfrm>
+      </p:grpSpPr>
+      <p:sp>
+        <p:nvSpPr>
+          <p:cNvPr id="2" name="Slide Image Placeholder 1"/>
+          <p:cNvSpPr>
+            <a:spLocks noGrp="1" noRot="1" noChangeAspect="1"/>
+          </p:cNvSpPr>
+          <p:nvPr>
+            <p:ph type="sldImg"/>
+          </p:nvPr>
+        </p:nvSpPr>
+        <p:spPr/>
+      </p:sp>
+      <p:sp>
+        <p:nvSpPr>
+          <p:cNvPr id="3" name="Notes Placeholder 2"/>
+          <p:cNvSpPr>
+            <a:spLocks noGrp="1"/>
+          </p:cNvSpPr>
+          <p:nvPr>
+            <p:ph type="body" idx="1"/>
+          </p:nvPr>
+        </p:nvSpPr>
+        <p:spPr/>
+        <p:txBody>
+          <a:bodyPr/>
+          <a:lstStyle/>
+          <a:p>
+            <a:r>
+              <a:rPr lang="en-US" dirty="0"/>
+              <a:t>Tool wine: "wine --version" installation </a:t>
+            </a:r>
+            <a:r>
+              <a:rPr lang="en-US" dirty="0" err="1"/>
+              <a:t>successed</a:t>
+            </a:r>
+            <a:r>
+              <a:rPr lang="en-US" dirty="0"/>
+              <a:t>!                                                                                 </a:t>
+            </a:r>
+          </a:p>
+          <a:p>
+            <a:r>
+              <a:rPr lang="en-US" dirty="0"/>
+              <a:t>Tool </a:t>
+            </a:r>
+            <a:r>
+              <a:rPr lang="en-US" dirty="0" err="1"/>
+              <a:t>pff</a:t>
+            </a:r>
+            <a:r>
+              <a:rPr lang="en-US" dirty="0"/>
+              <a:t>-tools: "</a:t>
+            </a:r>
+            <a:r>
+              <a:rPr lang="en-US" dirty="0" err="1"/>
+              <a:t>pffexport</a:t>
+            </a:r>
+            <a:r>
+              <a:rPr lang="en-US" dirty="0"/>
+              <a:t> -h" installation </a:t>
+            </a:r>
+            <a:r>
+              <a:rPr lang="en-US" dirty="0" err="1"/>
+              <a:t>successed</a:t>
+            </a:r>
+            <a:r>
+              <a:rPr lang="en-US" dirty="0"/>
+              <a:t>!                                                                              </a:t>
+            </a:r>
+          </a:p>
+          <a:p>
+            <a:r>
+              <a:rPr lang="en-US" dirty="0"/>
+              <a:t>Tool </a:t>
+            </a:r>
+            <a:r>
+              <a:rPr lang="en-US" dirty="0" err="1"/>
+              <a:t>libesedb</a:t>
+            </a:r>
+            <a:r>
+              <a:rPr lang="en-US" dirty="0"/>
+              <a:t>-utils: "</a:t>
+            </a:r>
+            <a:r>
+              <a:rPr lang="en-US" dirty="0" err="1"/>
+              <a:t>esedbexport</a:t>
+            </a:r>
+            <a:r>
+              <a:rPr lang="en-US" dirty="0"/>
+              <a:t> -h" installation </a:t>
+            </a:r>
+            <a:r>
+              <a:rPr lang="en-US" dirty="0" err="1"/>
+              <a:t>successed</a:t>
+            </a:r>
+            <a:r>
+              <a:rPr lang="en-US" dirty="0"/>
+              <a:t>!                                                                       </a:t>
+            </a:r>
+          </a:p>
+          <a:p>
+            <a:r>
+              <a:rPr lang="en-US" dirty="0"/>
+              <a:t>Tool </a:t>
+            </a:r>
+            <a:r>
+              <a:rPr lang="en-US" dirty="0" err="1"/>
+              <a:t>liblnk</a:t>
+            </a:r>
+            <a:r>
+              <a:rPr lang="en-US" dirty="0"/>
+              <a:t>-utils: "</a:t>
+            </a:r>
+            <a:r>
+              <a:rPr lang="en-US" dirty="0" err="1"/>
+              <a:t>lnkinfo</a:t>
+            </a:r>
+            <a:r>
+              <a:rPr lang="en-US" dirty="0"/>
+              <a:t> -h" installation </a:t>
+            </a:r>
+            <a:r>
+              <a:rPr lang="en-US" dirty="0" err="1"/>
+              <a:t>successed</a:t>
+            </a:r>
+            <a:r>
+              <a:rPr lang="en-US" dirty="0"/>
+              <a:t>!                                                                             </a:t>
+            </a:r>
+          </a:p>
+          <a:p>
+            <a:r>
+              <a:rPr lang="en-US" dirty="0"/>
+              <a:t>Tool </a:t>
+            </a:r>
+            <a:r>
+              <a:rPr lang="en-US" dirty="0" err="1"/>
+              <a:t>usncarve</a:t>
+            </a:r>
+            <a:r>
+              <a:rPr lang="en-US" dirty="0"/>
+              <a:t>: "usncarve.py -h" installation </a:t>
+            </a:r>
+            <a:r>
+              <a:rPr lang="en-US" dirty="0" err="1"/>
+              <a:t>successed</a:t>
+            </a:r>
+            <a:r>
+              <a:rPr lang="en-US" dirty="0"/>
+              <a:t>!                                                                             </a:t>
+            </a:r>
+          </a:p>
+          <a:p>
+            <a:r>
+              <a:rPr lang="en-US" dirty="0"/>
+              <a:t>Tool </a:t>
+            </a:r>
+            <a:r>
+              <a:rPr lang="en-US" dirty="0" err="1"/>
+              <a:t>usnparser</a:t>
+            </a:r>
+            <a:r>
+              <a:rPr lang="en-US" dirty="0"/>
+              <a:t>: "usn.py -h" installation </a:t>
+            </a:r>
+            <a:r>
+              <a:rPr lang="en-US" dirty="0" err="1"/>
+              <a:t>successed</a:t>
+            </a:r>
+            <a:r>
+              <a:rPr lang="en-US" dirty="0"/>
+              <a:t>!                                                                                 </a:t>
+            </a:r>
+          </a:p>
+          <a:p>
+            <a:r>
+              <a:rPr lang="en-US" dirty="0"/>
+              <a:t>Tool RegRipper30: "rip.pl -h" installation </a:t>
+            </a:r>
+            <a:r>
+              <a:rPr lang="en-US" dirty="0" err="1"/>
+              <a:t>successed</a:t>
+            </a:r>
+            <a:r>
+              <a:rPr lang="en-US" dirty="0"/>
+              <a:t>!                                                                               </a:t>
+            </a:r>
+          </a:p>
+          <a:p>
+            <a:r>
+              <a:rPr lang="en-US" dirty="0"/>
+              <a:t>Tool </a:t>
+            </a:r>
+            <a:r>
+              <a:rPr lang="en-US" dirty="0" err="1"/>
+              <a:t>Vinetto</a:t>
+            </a:r>
+            <a:r>
+              <a:rPr lang="en-US" dirty="0"/>
+              <a:t>: "</a:t>
+            </a:r>
+            <a:r>
+              <a:rPr lang="en-US" dirty="0" err="1"/>
+              <a:t>vinetto</a:t>
+            </a:r>
+            <a:r>
+              <a:rPr lang="en-US" dirty="0"/>
+              <a:t> -h" installation </a:t>
+            </a:r>
+            <a:r>
+              <a:rPr lang="en-US" dirty="0" err="1"/>
+              <a:t>successed</a:t>
+            </a:r>
+            <a:r>
+              <a:rPr lang="en-US" dirty="0"/>
+              <a:t>!                                                                                  </a:t>
+            </a:r>
+          </a:p>
+          <a:p>
+            <a:r>
+              <a:rPr lang="en-US" dirty="0"/>
+              <a:t>Tool </a:t>
+            </a:r>
+            <a:r>
+              <a:rPr lang="en-US" dirty="0" err="1"/>
+              <a:t>time_decode</a:t>
+            </a:r>
+            <a:r>
+              <a:rPr lang="en-US" dirty="0"/>
+              <a:t>: "time_decode.py -h" installation </a:t>
+            </a:r>
+            <a:r>
+              <a:rPr lang="en-US" dirty="0" err="1"/>
+              <a:t>successed</a:t>
+            </a:r>
+            <a:r>
+              <a:rPr lang="en-US" dirty="0"/>
+              <a:t>!                                                                       </a:t>
+            </a:r>
+          </a:p>
+          <a:p>
+            <a:r>
+              <a:rPr lang="en-US" dirty="0"/>
+              <a:t>Tool </a:t>
+            </a:r>
+            <a:r>
+              <a:rPr lang="en-US" dirty="0" err="1"/>
+              <a:t>windowsprefetch</a:t>
+            </a:r>
+            <a:r>
+              <a:rPr lang="en-US" dirty="0"/>
+              <a:t>: "prefetch.py -h" installation </a:t>
+            </a:r>
+            <a:r>
+              <a:rPr lang="en-US" dirty="0" err="1"/>
+              <a:t>successed</a:t>
+            </a:r>
+            <a:r>
+              <a:rPr lang="en-US" dirty="0"/>
+              <a:t>!                                                                      </a:t>
+            </a:r>
+          </a:p>
+          <a:p>
+            <a:r>
+              <a:rPr lang="en-US" dirty="0"/>
+              <a:t>Tool python3-evtx: "evtx_dump.py -h" installation </a:t>
+            </a:r>
+            <a:r>
+              <a:rPr lang="en-US" dirty="0" err="1"/>
+              <a:t>successed</a:t>
+            </a:r>
+            <a:r>
+              <a:rPr lang="en-US" dirty="0"/>
+              <a:t>!                                                                        </a:t>
+            </a:r>
+          </a:p>
+          <a:p>
+            <a:r>
+              <a:rPr lang="en-US" dirty="0"/>
+              <a:t>Tool </a:t>
+            </a:r>
+            <a:r>
+              <a:rPr lang="en-US" dirty="0" err="1"/>
+              <a:t>INDXParse</a:t>
+            </a:r>
+            <a:r>
+              <a:rPr lang="en-US" dirty="0"/>
+              <a:t>: "INDXParse.py -h" installation </a:t>
+            </a:r>
+            <a:r>
+              <a:rPr lang="en-US" dirty="0" err="1"/>
+              <a:t>successed</a:t>
+            </a:r>
+            <a:r>
+              <a:rPr lang="en-US" dirty="0"/>
+              <a:t>!                                                                           </a:t>
+            </a:r>
+          </a:p>
+          <a:p>
+            <a:r>
+              <a:rPr lang="en-US" dirty="0"/>
+              <a:t>Tool </a:t>
+            </a:r>
+            <a:r>
+              <a:rPr lang="en-US" dirty="0" err="1"/>
+              <a:t>analyzeMFT</a:t>
+            </a:r>
+            <a:r>
+              <a:rPr lang="en-US" dirty="0"/>
+              <a:t>: "analyzeMFT.py -h" installation </a:t>
+            </a:r>
+            <a:r>
+              <a:rPr lang="en-US" dirty="0" err="1"/>
+              <a:t>successed</a:t>
+            </a:r>
+            <a:r>
+              <a:rPr lang="en-US" dirty="0"/>
+              <a:t>!                                                                         </a:t>
+            </a:r>
+          </a:p>
+          <a:p>
+            <a:r>
+              <a:rPr lang="en-US" dirty="0"/>
+              <a:t>Tool </a:t>
+            </a:r>
+            <a:r>
+              <a:rPr lang="en-US" dirty="0" err="1"/>
+              <a:t>imgclip</a:t>
+            </a:r>
+            <a:r>
+              <a:rPr lang="en-US" dirty="0"/>
+              <a:t>: "</a:t>
+            </a:r>
+            <a:r>
+              <a:rPr lang="en-US" dirty="0" err="1"/>
+              <a:t>imgclip</a:t>
+            </a:r>
+            <a:r>
+              <a:rPr lang="en-US" dirty="0"/>
+              <a:t> -h" installation </a:t>
+            </a:r>
+            <a:r>
+              <a:rPr lang="en-US" dirty="0" err="1"/>
+              <a:t>successed</a:t>
+            </a:r>
+            <a:r>
+              <a:rPr lang="en-US" dirty="0"/>
+              <a:t>!                                                                                  </a:t>
+            </a:r>
+          </a:p>
+          <a:p>
+            <a:r>
+              <a:rPr lang="en-US" dirty="0"/>
+              <a:t>Tool </a:t>
+            </a:r>
+            <a:r>
+              <a:rPr lang="en-US" dirty="0" err="1"/>
+              <a:t>undark</a:t>
+            </a:r>
+            <a:r>
+              <a:rPr lang="en-US" dirty="0"/>
+              <a:t>: "</a:t>
+            </a:r>
+            <a:r>
+              <a:rPr lang="en-US" dirty="0" err="1"/>
+              <a:t>undark</a:t>
+            </a:r>
+            <a:r>
+              <a:rPr lang="en-US" dirty="0"/>
+              <a:t> -h" installation </a:t>
+            </a:r>
+            <a:r>
+              <a:rPr lang="en-US" dirty="0" err="1"/>
+              <a:t>successed</a:t>
+            </a:r>
+            <a:r>
+              <a:rPr lang="en-US" dirty="0"/>
+              <a:t>!                                                                                    </a:t>
+            </a:r>
+          </a:p>
+          <a:p>
+            <a:r>
+              <a:rPr lang="en-US" dirty="0"/>
+              <a:t>Tool </a:t>
+            </a:r>
+            <a:r>
+              <a:rPr lang="en-US" dirty="0" err="1"/>
+              <a:t>stegdetect</a:t>
+            </a:r>
+            <a:r>
+              <a:rPr lang="en-US" dirty="0"/>
+              <a:t>: "</a:t>
+            </a:r>
+            <a:r>
+              <a:rPr lang="en-US" dirty="0" err="1"/>
+              <a:t>stegdetect</a:t>
+            </a:r>
+            <a:r>
+              <a:rPr lang="en-US" dirty="0"/>
+              <a:t> -V" installation </a:t>
+            </a:r>
+            <a:r>
+              <a:rPr lang="en-US" dirty="0" err="1"/>
+              <a:t>successed</a:t>
+            </a:r>
+            <a:r>
+              <a:rPr lang="en-US" dirty="0"/>
+              <a:t>!                                                                            </a:t>
+            </a:r>
+          </a:p>
+          <a:p>
+            <a:r>
+              <a:rPr lang="en-US" dirty="0"/>
+              <a:t>Tool </a:t>
+            </a:r>
+            <a:r>
+              <a:rPr lang="en-US" dirty="0" err="1"/>
+              <a:t>stegbreak</a:t>
+            </a:r>
+            <a:r>
+              <a:rPr lang="en-US" dirty="0"/>
+              <a:t>: "</a:t>
+            </a:r>
+            <a:r>
+              <a:rPr lang="en-US" dirty="0" err="1"/>
+              <a:t>stegbreak</a:t>
+            </a:r>
+            <a:r>
+              <a:rPr lang="en-US" dirty="0"/>
+              <a:t> -V" installation </a:t>
+            </a:r>
+            <a:r>
+              <a:rPr lang="en-US" dirty="0" err="1"/>
+              <a:t>successed</a:t>
+            </a:r>
+            <a:r>
+              <a:rPr lang="en-US" dirty="0"/>
+              <a:t>!                                                                              </a:t>
+            </a:r>
+          </a:p>
+          <a:p>
+            <a:r>
+              <a:rPr lang="en-US" dirty="0"/>
+              <a:t>Tool </a:t>
+            </a:r>
+            <a:r>
+              <a:rPr lang="en-US" dirty="0" err="1"/>
+              <a:t>stego</a:t>
+            </a:r>
+            <a:r>
+              <a:rPr lang="en-US" dirty="0"/>
+              <a:t>-toolkit: "</a:t>
+            </a:r>
+            <a:r>
+              <a:rPr lang="en-US" dirty="0" err="1"/>
+              <a:t>jphide</a:t>
+            </a:r>
+            <a:r>
+              <a:rPr lang="en-US" dirty="0"/>
+              <a:t>" installation </a:t>
+            </a:r>
+            <a:r>
+              <a:rPr lang="en-US" dirty="0" err="1"/>
+              <a:t>successed</a:t>
+            </a:r>
+            <a:r>
+              <a:rPr lang="en-US" dirty="0"/>
+              <a:t>!                                                                                </a:t>
+            </a:r>
+          </a:p>
+          <a:p>
+            <a:r>
+              <a:rPr lang="en-US" dirty="0"/>
+              <a:t>Tool </a:t>
+            </a:r>
+            <a:r>
+              <a:rPr lang="en-US" dirty="0" err="1"/>
+              <a:t>stego</a:t>
+            </a:r>
+            <a:r>
+              <a:rPr lang="en-US" dirty="0"/>
+              <a:t>-toolkit: "</a:t>
+            </a:r>
+            <a:r>
+              <a:rPr lang="en-US" dirty="0" err="1"/>
+              <a:t>jpseek</a:t>
+            </a:r>
+            <a:r>
+              <a:rPr lang="en-US" dirty="0"/>
+              <a:t>" installation </a:t>
+            </a:r>
+            <a:r>
+              <a:rPr lang="en-US" dirty="0" err="1"/>
+              <a:t>successed</a:t>
+            </a:r>
+            <a:r>
+              <a:rPr lang="en-US" dirty="0"/>
+              <a:t>! </a:t>
+            </a:r>
+          </a:p>
+        </p:txBody>
+      </p:sp>
+      <p:sp>
+        <p:nvSpPr>
+          <p:cNvPr id="4" name="Slide Number Placeholder 3"/>
+          <p:cNvSpPr>
+            <a:spLocks noGrp="1"/>
+          </p:cNvSpPr>
+          <p:nvPr>
+            <p:ph type="sldNum" sz="quarter" idx="5"/>
+          </p:nvPr>
+        </p:nvSpPr>
+        <p:spPr/>
+        <p:txBody>
+          <a:bodyPr/>
+          <a:lstStyle/>
+          <a:p>
+            <a:fld id="{DDBF98C7-164A-4723-84F0-B1E4B080DDEC}" type="slidenum">
+              <a:rPr lang="en-US" smtClean="0"/>
+              <a:t>5</a:t>
+            </a:fld>
+            <a:endParaRPr lang="en-US"/>
+          </a:p>
+        </p:txBody>
+      </p:sp>
+    </p:spTree>
+    <p:extLst>
+      <p:ext uri="{BB962C8B-B14F-4D97-AF65-F5344CB8AC3E}">
+        <p14:creationId xmlns:p14="http://schemas.microsoft.com/office/powerpoint/2010/main" val="2434935869"/>
+      </p:ext>
+    </p:extLst>
+  </p:cSld>
+  <p:clrMapOvr>
+    <a:masterClrMapping/>
+  </p:clrMapOvr>
+</p:notes>
+</file>
+
 <file path=ppt/slideLayouts/slideLayout1.xml><?xml version="1.0" encoding="utf-8"?>
 <p:sldLayout xmlns:a="http://schemas.openxmlformats.org/drawingml/2006/main" xmlns:r="http://schemas.openxmlformats.org/officeDocument/2006/relationships" xmlns:p="http://schemas.openxmlformats.org/presentationml/2006/main" type="title" preserve="1">
   <p:cSld name="Title Slide">
@@ -868,7 +1619,7 @@
           <a:p>
             <a:fld id="{4263717A-E3C1-4BED-ABE0-B7069385E023}" type="datetimeFigureOut">
               <a:rPr lang="en-US" smtClean="0"/>
-              <a:t>2/20/2021</a:t>
+              <a:t>12/5/2021</a:t>
             </a:fld>
             <a:endParaRPr lang="en-US"/>
           </a:p>
@@ -1041,7 +1792,7 @@
           <a:p>
             <a:fld id="{4263717A-E3C1-4BED-ABE0-B7069385E023}" type="datetimeFigureOut">
               <a:rPr lang="en-US" smtClean="0"/>
-              <a:t>2/20/2021</a:t>
+              <a:t>12/5/2021</a:t>
             </a:fld>
             <a:endParaRPr lang="en-US"/>
           </a:p>
@@ -1219,7 +1970,7 @@
           <a:p>
             <a:fld id="{4263717A-E3C1-4BED-ABE0-B7069385E023}" type="datetimeFigureOut">
               <a:rPr lang="en-US" smtClean="0"/>
-              <a:t>2/20/2021</a:t>
+              <a:t>12/5/2021</a:t>
             </a:fld>
             <a:endParaRPr lang="en-US"/>
           </a:p>
@@ -1387,7 +2138,7 @@
           <a:p>
             <a:fld id="{4263717A-E3C1-4BED-ABE0-B7069385E023}" type="datetimeFigureOut">
               <a:rPr lang="en-US" smtClean="0"/>
-              <a:t>2/20/2021</a:t>
+              <a:t>12/5/2021</a:t>
             </a:fld>
             <a:endParaRPr lang="en-US"/>
           </a:p>
@@ -1632,7 +2383,7 @@
           <a:p>
             <a:fld id="{4263717A-E3C1-4BED-ABE0-B7069385E023}" type="datetimeFigureOut">
               <a:rPr lang="en-US" smtClean="0"/>
-              <a:t>2/20/2021</a:t>
+              <a:t>12/5/2021</a:t>
             </a:fld>
             <a:endParaRPr lang="en-US"/>
           </a:p>
@@ -1861,7 +2612,7 @@
           <a:p>
             <a:fld id="{4263717A-E3C1-4BED-ABE0-B7069385E023}" type="datetimeFigureOut">
               <a:rPr lang="en-US" smtClean="0"/>
-              <a:t>2/20/2021</a:t>
+              <a:t>12/5/2021</a:t>
             </a:fld>
             <a:endParaRPr lang="en-US"/>
           </a:p>
@@ -2225,7 +2976,7 @@
           <a:p>
             <a:fld id="{4263717A-E3C1-4BED-ABE0-B7069385E023}" type="datetimeFigureOut">
               <a:rPr lang="en-US" smtClean="0"/>
-              <a:t>2/20/2021</a:t>
+              <a:t>12/5/2021</a:t>
             </a:fld>
             <a:endParaRPr lang="en-US"/>
           </a:p>
@@ -2342,7 +3093,7 @@
           <a:p>
             <a:fld id="{4263717A-E3C1-4BED-ABE0-B7069385E023}" type="datetimeFigureOut">
               <a:rPr lang="en-US" smtClean="0"/>
-              <a:t>2/20/2021</a:t>
+              <a:t>12/5/2021</a:t>
             </a:fld>
             <a:endParaRPr lang="en-US"/>
           </a:p>
@@ -2437,7 +3188,7 @@
           <a:p>
             <a:fld id="{4263717A-E3C1-4BED-ABE0-B7069385E023}" type="datetimeFigureOut">
               <a:rPr lang="en-US" smtClean="0"/>
-              <a:t>2/20/2021</a:t>
+              <a:t>12/5/2021</a:t>
             </a:fld>
             <a:endParaRPr lang="en-US"/>
           </a:p>
@@ -2712,7 +3463,7 @@
           <a:p>
             <a:fld id="{4263717A-E3C1-4BED-ABE0-B7069385E023}" type="datetimeFigureOut">
               <a:rPr lang="en-US" smtClean="0"/>
-              <a:t>2/20/2021</a:t>
+              <a:t>12/5/2021</a:t>
             </a:fld>
             <a:endParaRPr lang="en-US"/>
           </a:p>
@@ -2964,7 +3715,7 @@
           <a:p>
             <a:fld id="{4263717A-E3C1-4BED-ABE0-B7069385E023}" type="datetimeFigureOut">
               <a:rPr lang="en-US" smtClean="0"/>
-              <a:t>2/20/2021</a:t>
+              <a:t>12/5/2021</a:t>
             </a:fld>
             <a:endParaRPr lang="en-US"/>
           </a:p>
@@ -3175,7 +3926,7 @@
           <a:p>
             <a:fld id="{4263717A-E3C1-4BED-ABE0-B7069385E023}" type="datetimeFigureOut">
               <a:rPr lang="en-US" smtClean="0"/>
-              <a:t>2/20/2021</a:t>
+              <a:t>12/5/2021</a:t>
             </a:fld>
             <a:endParaRPr lang="en-US"/>
           </a:p>
@@ -3761,7 +4512,7 @@
           <a:p>
             <a:r>
               <a:rPr lang="en-US" dirty="0"/>
-              <a:t>Tool Installation </a:t>
+              <a:t>Tools Installation </a:t>
             </a:r>
           </a:p>
         </p:txBody>
@@ -3921,10 +4672,510 @@
           </a:prstGeom>
         </p:spPr>
       </p:pic>
+      <p:sp>
+        <p:nvSpPr>
+          <p:cNvPr id="4" name="TextBox 3">
+            <a:extLst>
+              <a:ext uri="{FF2B5EF4-FFF2-40B4-BE49-F238E27FC236}">
+                <a16:creationId xmlns:a16="http://schemas.microsoft.com/office/drawing/2014/main" id="{303FFD26-04AD-46A7-A66E-5DE553BB6335}"/>
+              </a:ext>
+            </a:extLst>
+          </p:cNvPr>
+          <p:cNvSpPr txBox="1"/>
+          <p:nvPr/>
+        </p:nvSpPr>
+        <p:spPr>
+          <a:xfrm>
+            <a:off x="643467" y="4819394"/>
+            <a:ext cx="4083939" cy="369332"/>
+          </a:xfrm>
+          <a:prstGeom prst="rect">
+            <a:avLst/>
+          </a:prstGeom>
+          <a:solidFill>
+            <a:schemeClr val="accent4">
+              <a:lumMod val="20000"/>
+              <a:lumOff val="80000"/>
+            </a:schemeClr>
+          </a:solidFill>
+        </p:spPr>
+        <p:txBody>
+          <a:bodyPr wrap="none" rtlCol="0">
+            <a:spAutoFit/>
+          </a:bodyPr>
+          <a:lstStyle/>
+          <a:p>
+            <a:r>
+              <a:rPr lang="en-US" dirty="0"/>
+              <a:t>Press “enter” till you see the next screen. </a:t>
+            </a:r>
+          </a:p>
+        </p:txBody>
+      </p:sp>
     </p:spTree>
     <p:extLst>
       <p:ext uri="{BB962C8B-B14F-4D97-AF65-F5344CB8AC3E}">
         <p14:creationId xmlns:p14="http://schemas.microsoft.com/office/powerpoint/2010/main" val="2286009671"/>
+      </p:ext>
+    </p:extLst>
+  </p:cSld>
+  <p:clrMapOvr>
+    <a:masterClrMapping/>
+  </p:clrMapOvr>
+</p:sld>
+</file>
+
+<file path=ppt/slides/slide4.xml><?xml version="1.0" encoding="utf-8"?>
+<p:sld xmlns:a="http://schemas.openxmlformats.org/drawingml/2006/main" xmlns:r="http://schemas.openxmlformats.org/officeDocument/2006/relationships" xmlns:p="http://schemas.openxmlformats.org/presentationml/2006/main">
+  <p:cSld>
+    <p:spTree>
+      <p:nvGrpSpPr>
+        <p:cNvPr id="1" name=""/>
+        <p:cNvGrpSpPr/>
+        <p:nvPr/>
+      </p:nvGrpSpPr>
+      <p:grpSpPr>
+        <a:xfrm>
+          <a:off x="0" y="0"/>
+          <a:ext cx="0" cy="0"/>
+          <a:chOff x="0" y="0"/>
+          <a:chExt cx="0" cy="0"/>
+        </a:xfrm>
+      </p:grpSpPr>
+      <p:pic>
+        <p:nvPicPr>
+          <p:cNvPr id="3" name="Picture 2">
+            <a:extLst>
+              <a:ext uri="{FF2B5EF4-FFF2-40B4-BE49-F238E27FC236}">
+                <a16:creationId xmlns:a16="http://schemas.microsoft.com/office/drawing/2014/main" id="{9480B303-B423-455C-BE64-A5606F14ADFB}"/>
+              </a:ext>
+            </a:extLst>
+          </p:cNvPr>
+          <p:cNvPicPr>
+            <a:picLocks noChangeAspect="1"/>
+          </p:cNvPicPr>
+          <p:nvPr/>
+        </p:nvPicPr>
+        <p:blipFill>
+          <a:blip r:embed="rId2"/>
+          <a:stretch>
+            <a:fillRect/>
+          </a:stretch>
+        </p:blipFill>
+        <p:spPr>
+          <a:xfrm>
+            <a:off x="916344" y="1176277"/>
+            <a:ext cx="10359311" cy="4177142"/>
+          </a:xfrm>
+          <a:prstGeom prst="rect">
+            <a:avLst/>
+          </a:prstGeom>
+        </p:spPr>
+      </p:pic>
+      <p:sp>
+        <p:nvSpPr>
+          <p:cNvPr id="5" name="TextBox 4">
+            <a:extLst>
+              <a:ext uri="{FF2B5EF4-FFF2-40B4-BE49-F238E27FC236}">
+                <a16:creationId xmlns:a16="http://schemas.microsoft.com/office/drawing/2014/main" id="{B577749B-5C9B-4D97-A81E-B8337F04ACD0}"/>
+              </a:ext>
+            </a:extLst>
+          </p:cNvPr>
+          <p:cNvSpPr txBox="1"/>
+          <p:nvPr/>
+        </p:nvSpPr>
+        <p:spPr>
+          <a:xfrm>
+            <a:off x="916344" y="806945"/>
+            <a:ext cx="7256089" cy="369332"/>
+          </a:xfrm>
+          <a:prstGeom prst="rect">
+            <a:avLst/>
+          </a:prstGeom>
+          <a:solidFill>
+            <a:schemeClr val="accent4"/>
+          </a:solidFill>
+        </p:spPr>
+        <p:txBody>
+          <a:bodyPr wrap="none" rtlCol="0">
+            <a:spAutoFit/>
+          </a:bodyPr>
+          <a:lstStyle/>
+          <a:p>
+            <a:r>
+              <a:rPr lang="en-US" dirty="0"/>
+              <a:t>Press enters till you see the following screen. Provide password if necessary</a:t>
+            </a:r>
+          </a:p>
+        </p:txBody>
+      </p:sp>
+    </p:spTree>
+    <p:extLst>
+      <p:ext uri="{BB962C8B-B14F-4D97-AF65-F5344CB8AC3E}">
+        <p14:creationId xmlns:p14="http://schemas.microsoft.com/office/powerpoint/2010/main" val="630671023"/>
+      </p:ext>
+    </p:extLst>
+  </p:cSld>
+  <p:clrMapOvr>
+    <a:masterClrMapping/>
+  </p:clrMapOvr>
+</p:sld>
+</file>
+
+<file path=ppt/slides/slide5.xml><?xml version="1.0" encoding="utf-8"?>
+<p:sld xmlns:a="http://schemas.openxmlformats.org/drawingml/2006/main" xmlns:r="http://schemas.openxmlformats.org/officeDocument/2006/relationships" xmlns:p="http://schemas.openxmlformats.org/presentationml/2006/main">
+  <p:cSld>
+    <p:spTree>
+      <p:nvGrpSpPr>
+        <p:cNvPr id="1" name=""/>
+        <p:cNvGrpSpPr/>
+        <p:nvPr/>
+      </p:nvGrpSpPr>
+      <p:grpSpPr>
+        <a:xfrm>
+          <a:off x="0" y="0"/>
+          <a:ext cx="0" cy="0"/>
+          <a:chOff x="0" y="0"/>
+          <a:chExt cx="0" cy="0"/>
+        </a:xfrm>
+      </p:grpSpPr>
+      <p:sp>
+        <p:nvSpPr>
+          <p:cNvPr id="4" name="TextBox 3">
+            <a:extLst>
+              <a:ext uri="{FF2B5EF4-FFF2-40B4-BE49-F238E27FC236}">
+                <a16:creationId xmlns:a16="http://schemas.microsoft.com/office/drawing/2014/main" id="{4DAEB8E1-78F8-488C-AD70-CFD781193B72}"/>
+              </a:ext>
+            </a:extLst>
+          </p:cNvPr>
+          <p:cNvSpPr txBox="1"/>
+          <p:nvPr/>
+        </p:nvSpPr>
+        <p:spPr>
+          <a:xfrm>
+            <a:off x="1557740" y="945059"/>
+            <a:ext cx="6228436" cy="369332"/>
+          </a:xfrm>
+          <a:prstGeom prst="rect">
+            <a:avLst/>
+          </a:prstGeom>
+          <a:solidFill>
+            <a:schemeClr val="accent4"/>
+          </a:solidFill>
+        </p:spPr>
+        <p:txBody>
+          <a:bodyPr wrap="none" rtlCol="0">
+            <a:spAutoFit/>
+          </a:bodyPr>
+          <a:lstStyle/>
+          <a:p>
+            <a:r>
+              <a:rPr lang="en-US" dirty="0"/>
+              <a:t>Show installation report and command line for list tools installed</a:t>
+            </a:r>
+          </a:p>
+        </p:txBody>
+      </p:sp>
+      <p:pic>
+        <p:nvPicPr>
+          <p:cNvPr id="6" name="Picture 5">
+            <a:extLst>
+              <a:ext uri="{FF2B5EF4-FFF2-40B4-BE49-F238E27FC236}">
+                <a16:creationId xmlns:a16="http://schemas.microsoft.com/office/drawing/2014/main" id="{BE7DF6FD-F81E-4FB0-88CA-C5C525AC36E6}"/>
+              </a:ext>
+            </a:extLst>
+          </p:cNvPr>
+          <p:cNvPicPr>
+            <a:picLocks noChangeAspect="1"/>
+          </p:cNvPicPr>
+          <p:nvPr/>
+        </p:nvPicPr>
+        <p:blipFill>
+          <a:blip r:embed="rId3"/>
+          <a:stretch>
+            <a:fillRect/>
+          </a:stretch>
+        </p:blipFill>
+        <p:spPr>
+          <a:xfrm>
+            <a:off x="1557740" y="1375232"/>
+            <a:ext cx="7780694" cy="4107536"/>
+          </a:xfrm>
+          <a:prstGeom prst="rect">
+            <a:avLst/>
+          </a:prstGeom>
+        </p:spPr>
+      </p:pic>
+    </p:spTree>
+    <p:extLst>
+      <p:ext uri="{BB962C8B-B14F-4D97-AF65-F5344CB8AC3E}">
+        <p14:creationId xmlns:p14="http://schemas.microsoft.com/office/powerpoint/2010/main" val="3083790316"/>
+      </p:ext>
+    </p:extLst>
+  </p:cSld>
+  <p:clrMapOvr>
+    <a:masterClrMapping/>
+  </p:clrMapOvr>
+</p:sld>
+</file>
+
+<file path=ppt/slides/slide6.xml><?xml version="1.0" encoding="utf-8"?>
+<p:sld xmlns:a="http://schemas.openxmlformats.org/drawingml/2006/main" xmlns:r="http://schemas.openxmlformats.org/officeDocument/2006/relationships" xmlns:p="http://schemas.openxmlformats.org/presentationml/2006/main">
+  <p:cSld>
+    <p:spTree>
+      <p:nvGrpSpPr>
+        <p:cNvPr id="1" name=""/>
+        <p:cNvGrpSpPr/>
+        <p:nvPr/>
+      </p:nvGrpSpPr>
+      <p:grpSpPr>
+        <a:xfrm>
+          <a:off x="0" y="0"/>
+          <a:ext cx="0" cy="0"/>
+          <a:chOff x="0" y="0"/>
+          <a:chExt cx="0" cy="0"/>
+        </a:xfrm>
+      </p:grpSpPr>
+      <p:pic>
+        <p:nvPicPr>
+          <p:cNvPr id="3" name="Picture 2">
+            <a:extLst>
+              <a:ext uri="{FF2B5EF4-FFF2-40B4-BE49-F238E27FC236}">
+                <a16:creationId xmlns:a16="http://schemas.microsoft.com/office/drawing/2014/main" id="{87C902FC-FA35-42DC-9ACE-A8EC34A42E98}"/>
+              </a:ext>
+            </a:extLst>
+          </p:cNvPr>
+          <p:cNvPicPr>
+            <a:picLocks noChangeAspect="1"/>
+          </p:cNvPicPr>
+          <p:nvPr/>
+        </p:nvPicPr>
+        <p:blipFill>
+          <a:blip r:embed="rId2"/>
+          <a:stretch>
+            <a:fillRect/>
+          </a:stretch>
+        </p:blipFill>
+        <p:spPr>
+          <a:xfrm>
+            <a:off x="1570810" y="1113392"/>
+            <a:ext cx="2772731" cy="577652"/>
+          </a:xfrm>
+          <a:prstGeom prst="rect">
+            <a:avLst/>
+          </a:prstGeom>
+        </p:spPr>
+      </p:pic>
+      <p:sp>
+        <p:nvSpPr>
+          <p:cNvPr id="6" name="TextBox 5">
+            <a:extLst>
+              <a:ext uri="{FF2B5EF4-FFF2-40B4-BE49-F238E27FC236}">
+                <a16:creationId xmlns:a16="http://schemas.microsoft.com/office/drawing/2014/main" id="{D6E2BE78-65E9-4AE9-914E-6030127E2FF3}"/>
+              </a:ext>
+            </a:extLst>
+          </p:cNvPr>
+          <p:cNvSpPr txBox="1"/>
+          <p:nvPr/>
+        </p:nvSpPr>
+        <p:spPr>
+          <a:xfrm>
+            <a:off x="1570810" y="744060"/>
+            <a:ext cx="863506" cy="369332"/>
+          </a:xfrm>
+          <a:prstGeom prst="rect">
+            <a:avLst/>
+          </a:prstGeom>
+          <a:solidFill>
+            <a:schemeClr val="accent4"/>
+          </a:solidFill>
+        </p:spPr>
+        <p:txBody>
+          <a:bodyPr wrap="none" rtlCol="0">
+            <a:spAutoFit/>
+          </a:bodyPr>
+          <a:lstStyle/>
+          <a:p>
+            <a:r>
+              <a:rPr lang="en-US" dirty="0"/>
+              <a:t>Reboot</a:t>
+            </a:r>
+          </a:p>
+        </p:txBody>
+      </p:sp>
+      <p:sp>
+        <p:nvSpPr>
+          <p:cNvPr id="7" name="TextBox 6">
+            <a:extLst>
+              <a:ext uri="{FF2B5EF4-FFF2-40B4-BE49-F238E27FC236}">
+                <a16:creationId xmlns:a16="http://schemas.microsoft.com/office/drawing/2014/main" id="{A2FB07EC-1DDF-4D9B-A06D-821DC660C03C}"/>
+              </a:ext>
+            </a:extLst>
+          </p:cNvPr>
+          <p:cNvSpPr txBox="1"/>
+          <p:nvPr/>
+        </p:nvSpPr>
+        <p:spPr>
+          <a:xfrm>
+            <a:off x="5531780" y="744060"/>
+            <a:ext cx="2422010" cy="369332"/>
+          </a:xfrm>
+          <a:prstGeom prst="rect">
+            <a:avLst/>
+          </a:prstGeom>
+          <a:solidFill>
+            <a:schemeClr val="accent4"/>
+          </a:solidFill>
+        </p:spPr>
+        <p:txBody>
+          <a:bodyPr wrap="none" rtlCol="0">
+            <a:spAutoFit/>
+          </a:bodyPr>
+          <a:lstStyle/>
+          <a:p>
+            <a:r>
+              <a:rPr lang="en-US" dirty="0"/>
+              <a:t>Open a boot terminator</a:t>
+            </a:r>
+          </a:p>
+        </p:txBody>
+      </p:sp>
+      <p:pic>
+        <p:nvPicPr>
+          <p:cNvPr id="9" name="Picture 8">
+            <a:extLst>
+              <a:ext uri="{FF2B5EF4-FFF2-40B4-BE49-F238E27FC236}">
+                <a16:creationId xmlns:a16="http://schemas.microsoft.com/office/drawing/2014/main" id="{6AC45E9D-FD45-4E9D-8872-E9E017692AB7}"/>
+              </a:ext>
+            </a:extLst>
+          </p:cNvPr>
+          <p:cNvPicPr>
+            <a:picLocks noChangeAspect="1"/>
+          </p:cNvPicPr>
+          <p:nvPr/>
+        </p:nvPicPr>
+        <p:blipFill>
+          <a:blip r:embed="rId3"/>
+          <a:stretch>
+            <a:fillRect/>
+          </a:stretch>
+        </p:blipFill>
+        <p:spPr>
+          <a:xfrm>
+            <a:off x="5531780" y="1113392"/>
+            <a:ext cx="4275190" cy="5006774"/>
+          </a:xfrm>
+          <a:prstGeom prst="rect">
+            <a:avLst/>
+          </a:prstGeom>
+        </p:spPr>
+      </p:pic>
+    </p:spTree>
+    <p:extLst>
+      <p:ext uri="{BB962C8B-B14F-4D97-AF65-F5344CB8AC3E}">
+        <p14:creationId xmlns:p14="http://schemas.microsoft.com/office/powerpoint/2010/main" val="182520641"/>
+      </p:ext>
+    </p:extLst>
+  </p:cSld>
+  <p:clrMapOvr>
+    <a:masterClrMapping/>
+  </p:clrMapOvr>
+</p:sld>
+</file>
+
+<file path=ppt/slides/slide7.xml><?xml version="1.0" encoding="utf-8"?>
+<p:sld xmlns:a="http://schemas.openxmlformats.org/drawingml/2006/main" xmlns:r="http://schemas.openxmlformats.org/officeDocument/2006/relationships" xmlns:p="http://schemas.openxmlformats.org/presentationml/2006/main">
+  <p:cSld>
+    <p:spTree>
+      <p:nvGrpSpPr>
+        <p:cNvPr id="1" name=""/>
+        <p:cNvGrpSpPr/>
+        <p:nvPr/>
+      </p:nvGrpSpPr>
+      <p:grpSpPr>
+        <a:xfrm>
+          <a:off x="0" y="0"/>
+          <a:ext cx="0" cy="0"/>
+          <a:chOff x="0" y="0"/>
+          <a:chExt cx="0" cy="0"/>
+        </a:xfrm>
+      </p:grpSpPr>
+      <p:pic>
+        <p:nvPicPr>
+          <p:cNvPr id="3" name="Picture 2">
+            <a:extLst>
+              <a:ext uri="{FF2B5EF4-FFF2-40B4-BE49-F238E27FC236}">
+                <a16:creationId xmlns:a16="http://schemas.microsoft.com/office/drawing/2014/main" id="{CF56EC7F-AE97-4545-B600-20CC1218EF4E}"/>
+              </a:ext>
+            </a:extLst>
+          </p:cNvPr>
+          <p:cNvPicPr>
+            <a:picLocks noChangeAspect="1"/>
+          </p:cNvPicPr>
+          <p:nvPr/>
+        </p:nvPicPr>
+        <p:blipFill>
+          <a:blip r:embed="rId2"/>
+          <a:stretch>
+            <a:fillRect/>
+          </a:stretch>
+        </p:blipFill>
+        <p:spPr>
+          <a:xfrm>
+            <a:off x="1795619" y="1908036"/>
+            <a:ext cx="8600761" cy="3785754"/>
+          </a:xfrm>
+          <a:prstGeom prst="rect">
+            <a:avLst/>
+          </a:prstGeom>
+        </p:spPr>
+      </p:pic>
+      <p:sp>
+        <p:nvSpPr>
+          <p:cNvPr id="4" name="TextBox 3">
+            <a:extLst>
+              <a:ext uri="{FF2B5EF4-FFF2-40B4-BE49-F238E27FC236}">
+                <a16:creationId xmlns:a16="http://schemas.microsoft.com/office/drawing/2014/main" id="{C0BA3F63-FC76-488B-8B77-DF400E1F0C44}"/>
+              </a:ext>
+            </a:extLst>
+          </p:cNvPr>
+          <p:cNvSpPr txBox="1"/>
+          <p:nvPr/>
+        </p:nvSpPr>
+        <p:spPr>
+          <a:xfrm>
+            <a:off x="1795619" y="1538704"/>
+            <a:ext cx="4688206" cy="369332"/>
+          </a:xfrm>
+          <a:prstGeom prst="rect">
+            <a:avLst/>
+          </a:prstGeom>
+          <a:solidFill>
+            <a:schemeClr val="accent4"/>
+          </a:solidFill>
+        </p:spPr>
+        <p:txBody>
+          <a:bodyPr wrap="none" rtlCol="0">
+            <a:spAutoFit/>
+          </a:bodyPr>
+          <a:lstStyle/>
+          <a:p>
+            <a:r>
+              <a:rPr lang="en-US" dirty="0"/>
+              <a:t>volatility 2 only works for Kali account (</a:t>
+            </a:r>
+            <a:r>
+              <a:rPr lang="en-US"/>
+              <a:t>not root)</a:t>
+            </a:r>
+            <a:endParaRPr lang="en-US" dirty="0"/>
+          </a:p>
+        </p:txBody>
+      </p:sp>
+    </p:spTree>
+    <p:extLst>
+      <p:ext uri="{BB962C8B-B14F-4D97-AF65-F5344CB8AC3E}">
+        <p14:creationId xmlns:p14="http://schemas.microsoft.com/office/powerpoint/2010/main" val="3541242312"/>
       </p:ext>
     </p:extLst>
   </p:cSld>

</xml_diff>